<commit_message>
new file and revise code
</commit_message>
<xml_diff>
--- a/src/java08-AbstractInterface.pptx
+++ b/src/java08-AbstractInterface.pptx
@@ -239,7 +239,7 @@
           <a:p>
             <a:fld id="{888A7752-73DE-404C-BA6F-63DEF987950B}" type="datetimeFigureOut">
               <a:pPr/>
-              <a:t>2019-05-21</a:t>
+              <a:t>2019-05-28</a:t>
             </a:fld>
             <a:endParaRPr lang="ko-KR"/>
           </a:p>
@@ -11239,7 +11239,7 @@
           <a:p>
             <a:fld id="{813260A6-F008-48B4-8EE9-99AC2060C267}" type="datetime1">
               <a:rPr lang="ko-KR" altLang="en-US" smtClean="0"/>
-              <a:t>2019-05-21</a:t>
+              <a:t>2019-05-28</a:t>
             </a:fld>
             <a:endParaRPr lang="en-US" altLang="en-US" sz="1600"/>
           </a:p>
@@ -11652,7 +11652,7 @@
             <a:pPr algn="r"/>
             <a:fld id="{1A2CA61A-A745-47DB-93D7-4AB2D658F369}" type="datetime1">
               <a:rPr lang="ko-KR" altLang="en-US" smtClean="0"/>
-              <a:t>2019-05-21</a:t>
+              <a:t>2019-05-28</a:t>
             </a:fld>
             <a:endParaRPr lang="ko-KR"/>
           </a:p>
@@ -11833,7 +11833,7 @@
             <a:pPr algn="r"/>
             <a:fld id="{99B291CD-8DA3-432B-9495-9C7F2E25386C}" type="datetime1">
               <a:rPr lang="ko-KR" altLang="en-US" smtClean="0"/>
-              <a:t>2019-05-21</a:t>
+              <a:t>2019-05-28</a:t>
             </a:fld>
             <a:endParaRPr lang="ko-KR"/>
           </a:p>
@@ -12096,7 +12096,7 @@
             <a:pPr algn="r"/>
             <a:fld id="{40101D6B-7DA2-47A5-B5D7-90F47AC5058A}" type="datetime1">
               <a:rPr lang="ko-KR" altLang="en-US" smtClean="0"/>
-              <a:t>2019-05-21</a:t>
+              <a:t>2019-05-28</a:t>
             </a:fld>
             <a:endParaRPr lang="ko-KR" dirty="0"/>
           </a:p>
@@ -12415,7 +12415,7 @@
           <a:p>
             <a:fld id="{344DDD21-B466-4478-B937-E1FF55F6E55F}" type="datetime1">
               <a:rPr lang="ko-KR" altLang="en-US" smtClean="0"/>
-              <a:t>2019-05-21</a:t>
+              <a:t>2019-05-28</a:t>
             </a:fld>
             <a:endParaRPr lang="ko-KR"/>
           </a:p>
@@ -12642,7 +12642,7 @@
           <a:p>
             <a:fld id="{4684828B-368D-4DD4-9FC8-4C45B7EB7223}" type="datetime1">
               <a:rPr lang="ko-KR" altLang="en-US" smtClean="0"/>
-              <a:t>2019-05-21</a:t>
+              <a:t>2019-05-28</a:t>
             </a:fld>
             <a:endParaRPr lang="ko-KR"/>
           </a:p>
@@ -13001,7 +13001,7 @@
           <a:p>
             <a:fld id="{67713157-F1F4-4938-8B89-71E2F3FC3135}" type="datetime1">
               <a:rPr lang="ko-KR" altLang="en-US" smtClean="0"/>
-              <a:t>2019-05-21</a:t>
+              <a:t>2019-05-28</a:t>
             </a:fld>
             <a:endParaRPr lang="ko-KR"/>
           </a:p>
@@ -13239,7 +13239,7 @@
             <a:pPr algn="r"/>
             <a:fld id="{F68DC9FA-8B12-4E4A-9D31-359B91F61C40}" type="datetime1">
               <a:rPr lang="ko-KR" altLang="en-US" smtClean="0"/>
-              <a:t>2019-05-21</a:t>
+              <a:t>2019-05-28</a:t>
             </a:fld>
             <a:endParaRPr lang="ko-KR"/>
           </a:p>
@@ -13448,7 +13448,7 @@
           <a:p>
             <a:fld id="{6DBE83C8-8C30-4149-85E8-632A664A8707}" type="datetime1">
               <a:rPr lang="ko-KR" altLang="en-US" smtClean="0"/>
-              <a:t>2019-05-21</a:t>
+              <a:t>2019-05-28</a:t>
             </a:fld>
             <a:endParaRPr lang="ko-KR"/>
           </a:p>
@@ -13726,7 +13726,7 @@
             <a:pPr algn="r"/>
             <a:fld id="{47931541-0274-4262-9CDB-C46A71AB91D4}" type="datetime1">
               <a:rPr lang="ko-KR" altLang="en-US" smtClean="0"/>
-              <a:t>2019-05-21</a:t>
+              <a:t>2019-05-28</a:t>
             </a:fld>
             <a:endParaRPr lang="ko-KR"/>
           </a:p>
@@ -14134,7 +14134,7 @@
             <a:pPr algn="r"/>
             <a:fld id="{E6E0C75A-8011-4990-806A-A7D6A06208E1}" type="datetime1">
               <a:rPr lang="ko-KR" altLang="en-US" smtClean="0"/>
-              <a:t>2019-05-21</a:t>
+              <a:t>2019-05-28</a:t>
             </a:fld>
             <a:endParaRPr lang="ko-KR"/>
           </a:p>
@@ -14496,7 +14496,7 @@
             <a:pPr algn="r"/>
             <a:fld id="{A433598D-4CCC-4B77-A1B9-4384E03BADEE}" type="datetime1">
               <a:rPr lang="ko-KR" altLang="en-US" smtClean="0"/>
-              <a:t>2019-05-21</a:t>
+              <a:t>2019-05-28</a:t>
             </a:fld>
             <a:endParaRPr lang="ko-KR" altLang="en-US"/>
           </a:p>
@@ -20597,16 +20597,29 @@
         </p:nvSpPr>
         <p:spPr/>
         <p:txBody>
-          <a:bodyPr/>
+          <a:bodyPr>
+            <a:normAutofit fontScale="90000"/>
+          </a:bodyPr>
           <a:lstStyle/>
           <a:p>
             <a:r>
+              <a:rPr lang="ko-KR" altLang="en-US" dirty="0" err="1" smtClean="0"/>
+              <a:t>유응구씹새끼</a:t>
+            </a:r>
+            <a:r>
               <a:rPr lang="en-US" altLang="ko-KR" dirty="0" smtClean="0"/>
-              <a:t>2A</a:t>
-            </a:r>
+              <a:t/>
+            </a:r>
+            <a:br>
+              <a:rPr lang="en-US" altLang="ko-KR" dirty="0" smtClean="0"/>
+            </a:br>
             <a:r>
               <a:rPr lang="ko-KR" altLang="en-US" dirty="0" smtClean="0"/>
-              <a:t>반 만 과제</a:t>
+              <a:t>반 </a:t>
+            </a:r>
+            <a:r>
+              <a:rPr lang="ko-KR" altLang="en-US" dirty="0" smtClean="0"/>
+              <a:t>만 과제</a:t>
             </a:r>
             <a:endParaRPr lang="ko-KR" altLang="en-US" dirty="0"/>
           </a:p>

</xml_diff>